<commit_message>
Update Developer Guide with AppointmentStorage feature
</commit_message>
<xml_diff>
--- a/docs/diagrams/StorageComponentClassDiagram.pptx
+++ b/docs/diagrams/StorageComponentClassDiagram.pptx
@@ -107,6 +107,22 @@
       </a:defRPr>
     </a:lvl9pPr>
   </p:defaultTextStyle>
+  <p:extLst>
+    <p:ext uri="{EFAFB233-063F-42B5-8137-9DF3F51BA10A}">
+      <p15:sldGuideLst xmlns:p15="http://schemas.microsoft.com/office/powerpoint/2012/main">
+        <p15:guide id="1" orient="horz" pos="1488">
+          <p15:clr>
+            <a:srgbClr val="A4A3A4"/>
+          </p15:clr>
+        </p15:guide>
+        <p15:guide id="2" pos="2880">
+          <p15:clr>
+            <a:srgbClr val="A4A3A4"/>
+          </p15:clr>
+        </p15:guide>
+      </p15:sldGuideLst>
+    </p:ext>
+  </p:extLst>
 </p:presentation>
 </file>
 
@@ -192,7 +208,7 @@
           <a:p>
             <a:fld id="{F5CC4B3F-88C1-4FFA-B1B6-F41C21DC6924}" type="datetimeFigureOut">
               <a:rPr lang="en-US" smtClean="0"/>
-              <a:t>10/16/2016</a:t>
+              <a:t>3/21/2018</a:t>
             </a:fld>
             <a:endParaRPr lang="en-US"/>
           </a:p>
@@ -256,38 +272,37 @@
           <a:p>
             <a:pPr lvl="0"/>
             <a:r>
-              <a:rPr lang="en-US" smtClean="0"/>
+              <a:rPr lang="en-US"/>
               <a:t>Click to edit Master text styles</a:t>
             </a:r>
           </a:p>
           <a:p>
             <a:pPr lvl="1"/>
             <a:r>
-              <a:rPr lang="en-US" smtClean="0"/>
+              <a:rPr lang="en-US"/>
               <a:t>Second level</a:t>
             </a:r>
           </a:p>
           <a:p>
             <a:pPr lvl="2"/>
             <a:r>
-              <a:rPr lang="en-US" smtClean="0"/>
+              <a:rPr lang="en-US"/>
               <a:t>Third level</a:t>
             </a:r>
           </a:p>
           <a:p>
             <a:pPr lvl="3"/>
             <a:r>
-              <a:rPr lang="en-US" smtClean="0"/>
+              <a:rPr lang="en-US"/>
               <a:t>Fourth level</a:t>
             </a:r>
           </a:p>
           <a:p>
             <a:pPr lvl="4"/>
             <a:r>
-              <a:rPr lang="en-US" smtClean="0"/>
+              <a:rPr lang="en-US"/>
               <a:t>Fifth level</a:t>
             </a:r>
-            <a:endParaRPr lang="en-US"/>
           </a:p>
         </p:txBody>
       </p:sp>
@@ -498,10 +513,9 @@
           <a:lstStyle/>
           <a:p>
             <a:r>
-              <a:rPr lang="en-US" smtClean="0"/>
+              <a:rPr lang="en-US"/>
               <a:t>Click to edit Master title style</a:t>
             </a:r>
-            <a:endParaRPr lang="en-US"/>
           </a:p>
         </p:txBody>
       </p:sp>
@@ -617,10 +631,9 @@
           </a:lstStyle>
           <a:p>
             <a:r>
-              <a:rPr lang="en-US" smtClean="0"/>
+              <a:rPr lang="en-US"/>
               <a:t>Click to edit Master subtitle style</a:t>
             </a:r>
-            <a:endParaRPr lang="en-US"/>
           </a:p>
         </p:txBody>
       </p:sp>
@@ -641,7 +654,7 @@
           <a:p>
             <a:fld id="{78C97017-6FC3-485B-9764-EAC9E56C1D49}" type="datetimeFigureOut">
               <a:rPr lang="en-US" smtClean="0"/>
-              <a:t>10/16/2016</a:t>
+              <a:t>3/21/2018</a:t>
             </a:fld>
             <a:endParaRPr lang="en-US"/>
           </a:p>
@@ -735,10 +748,9 @@
           <a:lstStyle/>
           <a:p>
             <a:r>
-              <a:rPr lang="en-US" smtClean="0"/>
+              <a:rPr lang="en-US"/>
               <a:t>Click to edit Master title style</a:t>
             </a:r>
-            <a:endParaRPr lang="en-US"/>
           </a:p>
         </p:txBody>
       </p:sp>
@@ -759,38 +771,37 @@
           <a:p>
             <a:pPr lvl="0"/>
             <a:r>
-              <a:rPr lang="en-US" smtClean="0"/>
+              <a:rPr lang="en-US"/>
               <a:t>Click to edit Master text styles</a:t>
             </a:r>
           </a:p>
           <a:p>
             <a:pPr lvl="1"/>
             <a:r>
-              <a:rPr lang="en-US" smtClean="0"/>
+              <a:rPr lang="en-US"/>
               <a:t>Second level</a:t>
             </a:r>
           </a:p>
           <a:p>
             <a:pPr lvl="2"/>
             <a:r>
-              <a:rPr lang="en-US" smtClean="0"/>
+              <a:rPr lang="en-US"/>
               <a:t>Third level</a:t>
             </a:r>
           </a:p>
           <a:p>
             <a:pPr lvl="3"/>
             <a:r>
-              <a:rPr lang="en-US" smtClean="0"/>
+              <a:rPr lang="en-US"/>
               <a:t>Fourth level</a:t>
             </a:r>
           </a:p>
           <a:p>
             <a:pPr lvl="4"/>
             <a:r>
-              <a:rPr lang="en-US" smtClean="0"/>
+              <a:rPr lang="en-US"/>
               <a:t>Fifth level</a:t>
             </a:r>
-            <a:endParaRPr lang="en-US"/>
           </a:p>
         </p:txBody>
       </p:sp>
@@ -811,7 +822,7 @@
           <a:p>
             <a:fld id="{78C97017-6FC3-485B-9764-EAC9E56C1D49}" type="datetimeFigureOut">
               <a:rPr lang="en-US" smtClean="0"/>
-              <a:t>10/16/2016</a:t>
+              <a:t>3/21/2018</a:t>
             </a:fld>
             <a:endParaRPr lang="en-US"/>
           </a:p>
@@ -910,10 +921,9 @@
           <a:lstStyle/>
           <a:p>
             <a:r>
-              <a:rPr lang="en-US" smtClean="0"/>
+              <a:rPr lang="en-US"/>
               <a:t>Click to edit Master title style</a:t>
             </a:r>
-            <a:endParaRPr lang="en-US"/>
           </a:p>
         </p:txBody>
       </p:sp>
@@ -939,38 +949,37 @@
           <a:p>
             <a:pPr lvl="0"/>
             <a:r>
-              <a:rPr lang="en-US" smtClean="0"/>
+              <a:rPr lang="en-US"/>
               <a:t>Click to edit Master text styles</a:t>
             </a:r>
           </a:p>
           <a:p>
             <a:pPr lvl="1"/>
             <a:r>
-              <a:rPr lang="en-US" smtClean="0"/>
+              <a:rPr lang="en-US"/>
               <a:t>Second level</a:t>
             </a:r>
           </a:p>
           <a:p>
             <a:pPr lvl="2"/>
             <a:r>
-              <a:rPr lang="en-US" smtClean="0"/>
+              <a:rPr lang="en-US"/>
               <a:t>Third level</a:t>
             </a:r>
           </a:p>
           <a:p>
             <a:pPr lvl="3"/>
             <a:r>
-              <a:rPr lang="en-US" smtClean="0"/>
+              <a:rPr lang="en-US"/>
               <a:t>Fourth level</a:t>
             </a:r>
           </a:p>
           <a:p>
             <a:pPr lvl="4"/>
             <a:r>
-              <a:rPr lang="en-US" smtClean="0"/>
+              <a:rPr lang="en-US"/>
               <a:t>Fifth level</a:t>
             </a:r>
-            <a:endParaRPr lang="en-US"/>
           </a:p>
         </p:txBody>
       </p:sp>
@@ -991,7 +1000,7 @@
           <a:p>
             <a:fld id="{78C97017-6FC3-485B-9764-EAC9E56C1D49}" type="datetimeFigureOut">
               <a:rPr lang="en-US" smtClean="0"/>
-              <a:t>10/16/2016</a:t>
+              <a:t>3/21/2018</a:t>
             </a:fld>
             <a:endParaRPr lang="en-US"/>
           </a:p>
@@ -1085,10 +1094,9 @@
           <a:lstStyle/>
           <a:p>
             <a:r>
-              <a:rPr lang="en-US" smtClean="0"/>
+              <a:rPr lang="en-US"/>
               <a:t>Click to edit Master title style</a:t>
             </a:r>
-            <a:endParaRPr lang="en-US"/>
           </a:p>
         </p:txBody>
       </p:sp>
@@ -1109,38 +1117,37 @@
           <a:p>
             <a:pPr lvl="0"/>
             <a:r>
-              <a:rPr lang="en-US" smtClean="0"/>
+              <a:rPr lang="en-US"/>
               <a:t>Click to edit Master text styles</a:t>
             </a:r>
           </a:p>
           <a:p>
             <a:pPr lvl="1"/>
             <a:r>
-              <a:rPr lang="en-US" smtClean="0"/>
+              <a:rPr lang="en-US"/>
               <a:t>Second level</a:t>
             </a:r>
           </a:p>
           <a:p>
             <a:pPr lvl="2"/>
             <a:r>
-              <a:rPr lang="en-US" smtClean="0"/>
+              <a:rPr lang="en-US"/>
               <a:t>Third level</a:t>
             </a:r>
           </a:p>
           <a:p>
             <a:pPr lvl="3"/>
             <a:r>
-              <a:rPr lang="en-US" smtClean="0"/>
+              <a:rPr lang="en-US"/>
               <a:t>Fourth level</a:t>
             </a:r>
           </a:p>
           <a:p>
             <a:pPr lvl="4"/>
             <a:r>
-              <a:rPr lang="en-US" smtClean="0"/>
+              <a:rPr lang="en-US"/>
               <a:t>Fifth level</a:t>
             </a:r>
-            <a:endParaRPr lang="en-US"/>
           </a:p>
         </p:txBody>
       </p:sp>
@@ -1161,7 +1168,7 @@
           <a:p>
             <a:fld id="{78C97017-6FC3-485B-9764-EAC9E56C1D49}" type="datetimeFigureOut">
               <a:rPr lang="en-US" smtClean="0"/>
-              <a:t>10/16/2016</a:t>
+              <a:t>3/21/2018</a:t>
             </a:fld>
             <a:endParaRPr lang="en-US"/>
           </a:p>
@@ -1264,10 +1271,9 @@
           </a:lstStyle>
           <a:p>
             <a:r>
-              <a:rPr lang="en-US" smtClean="0"/>
+              <a:rPr lang="en-US"/>
               <a:t>Click to edit Master title style</a:t>
             </a:r>
-            <a:endParaRPr lang="en-US"/>
           </a:p>
         </p:txBody>
       </p:sp>
@@ -1384,7 +1390,7 @@
           <a:p>
             <a:pPr lvl="0"/>
             <a:r>
-              <a:rPr lang="en-US" smtClean="0"/>
+              <a:rPr lang="en-US"/>
               <a:t>Click to edit Master text styles</a:t>
             </a:r>
           </a:p>
@@ -1407,7 +1413,7 @@
           <a:p>
             <a:fld id="{78C97017-6FC3-485B-9764-EAC9E56C1D49}" type="datetimeFigureOut">
               <a:rPr lang="en-US" smtClean="0"/>
-              <a:t>10/16/2016</a:t>
+              <a:t>3/21/2018</a:t>
             </a:fld>
             <a:endParaRPr lang="en-US"/>
           </a:p>
@@ -1501,10 +1507,9 @@
           <a:lstStyle/>
           <a:p>
             <a:r>
-              <a:rPr lang="en-US" smtClean="0"/>
+              <a:rPr lang="en-US"/>
               <a:t>Click to edit Master title style</a:t>
             </a:r>
-            <a:endParaRPr lang="en-US"/>
           </a:p>
         </p:txBody>
       </p:sp>
@@ -1558,38 +1563,37 @@
           <a:p>
             <a:pPr lvl="0"/>
             <a:r>
-              <a:rPr lang="en-US" smtClean="0"/>
+              <a:rPr lang="en-US"/>
               <a:t>Click to edit Master text styles</a:t>
             </a:r>
           </a:p>
           <a:p>
             <a:pPr lvl="1"/>
             <a:r>
-              <a:rPr lang="en-US" smtClean="0"/>
+              <a:rPr lang="en-US"/>
               <a:t>Second level</a:t>
             </a:r>
           </a:p>
           <a:p>
             <a:pPr lvl="2"/>
             <a:r>
-              <a:rPr lang="en-US" smtClean="0"/>
+              <a:rPr lang="en-US"/>
               <a:t>Third level</a:t>
             </a:r>
           </a:p>
           <a:p>
             <a:pPr lvl="3"/>
             <a:r>
-              <a:rPr lang="en-US" smtClean="0"/>
+              <a:rPr lang="en-US"/>
               <a:t>Fourth level</a:t>
             </a:r>
           </a:p>
           <a:p>
             <a:pPr lvl="4"/>
             <a:r>
-              <a:rPr lang="en-US" smtClean="0"/>
+              <a:rPr lang="en-US"/>
               <a:t>Fifth level</a:t>
             </a:r>
-            <a:endParaRPr lang="en-US"/>
           </a:p>
         </p:txBody>
       </p:sp>
@@ -1643,38 +1647,37 @@
           <a:p>
             <a:pPr lvl="0"/>
             <a:r>
-              <a:rPr lang="en-US" smtClean="0"/>
+              <a:rPr lang="en-US"/>
               <a:t>Click to edit Master text styles</a:t>
             </a:r>
           </a:p>
           <a:p>
             <a:pPr lvl="1"/>
             <a:r>
-              <a:rPr lang="en-US" smtClean="0"/>
+              <a:rPr lang="en-US"/>
               <a:t>Second level</a:t>
             </a:r>
           </a:p>
           <a:p>
             <a:pPr lvl="2"/>
             <a:r>
-              <a:rPr lang="en-US" smtClean="0"/>
+              <a:rPr lang="en-US"/>
               <a:t>Third level</a:t>
             </a:r>
           </a:p>
           <a:p>
             <a:pPr lvl="3"/>
             <a:r>
-              <a:rPr lang="en-US" smtClean="0"/>
+              <a:rPr lang="en-US"/>
               <a:t>Fourth level</a:t>
             </a:r>
           </a:p>
           <a:p>
             <a:pPr lvl="4"/>
             <a:r>
-              <a:rPr lang="en-US" smtClean="0"/>
+              <a:rPr lang="en-US"/>
               <a:t>Fifth level</a:t>
             </a:r>
-            <a:endParaRPr lang="en-US"/>
           </a:p>
         </p:txBody>
       </p:sp>
@@ -1695,7 +1698,7 @@
           <a:p>
             <a:fld id="{78C97017-6FC3-485B-9764-EAC9E56C1D49}" type="datetimeFigureOut">
               <a:rPr lang="en-US" smtClean="0"/>
-              <a:t>10/16/2016</a:t>
+              <a:t>3/21/2018</a:t>
             </a:fld>
             <a:endParaRPr lang="en-US"/>
           </a:p>
@@ -1793,10 +1796,9 @@
           </a:lstStyle>
           <a:p>
             <a:r>
-              <a:rPr lang="en-US" smtClean="0"/>
+              <a:rPr lang="en-US"/>
               <a:t>Click to edit Master title style</a:t>
             </a:r>
-            <a:endParaRPr lang="en-US"/>
           </a:p>
         </p:txBody>
       </p:sp>
@@ -1859,7 +1861,7 @@
           <a:p>
             <a:pPr lvl="0"/>
             <a:r>
-              <a:rPr lang="en-US" smtClean="0"/>
+              <a:rPr lang="en-US"/>
               <a:t>Click to edit Master text styles</a:t>
             </a:r>
           </a:p>
@@ -1915,38 +1917,37 @@
           <a:p>
             <a:pPr lvl="0"/>
             <a:r>
-              <a:rPr lang="en-US" smtClean="0"/>
+              <a:rPr lang="en-US"/>
               <a:t>Click to edit Master text styles</a:t>
             </a:r>
           </a:p>
           <a:p>
             <a:pPr lvl="1"/>
             <a:r>
-              <a:rPr lang="en-US" smtClean="0"/>
+              <a:rPr lang="en-US"/>
               <a:t>Second level</a:t>
             </a:r>
           </a:p>
           <a:p>
             <a:pPr lvl="2"/>
             <a:r>
-              <a:rPr lang="en-US" smtClean="0"/>
+              <a:rPr lang="en-US"/>
               <a:t>Third level</a:t>
             </a:r>
           </a:p>
           <a:p>
             <a:pPr lvl="3"/>
             <a:r>
-              <a:rPr lang="en-US" smtClean="0"/>
+              <a:rPr lang="en-US"/>
               <a:t>Fourth level</a:t>
             </a:r>
           </a:p>
           <a:p>
             <a:pPr lvl="4"/>
             <a:r>
-              <a:rPr lang="en-US" smtClean="0"/>
+              <a:rPr lang="en-US"/>
               <a:t>Fifth level</a:t>
             </a:r>
-            <a:endParaRPr lang="en-US"/>
           </a:p>
         </p:txBody>
       </p:sp>
@@ -2009,7 +2010,7 @@
           <a:p>
             <a:pPr lvl="0"/>
             <a:r>
-              <a:rPr lang="en-US" smtClean="0"/>
+              <a:rPr lang="en-US"/>
               <a:t>Click to edit Master text styles</a:t>
             </a:r>
           </a:p>
@@ -2065,38 +2066,37 @@
           <a:p>
             <a:pPr lvl="0"/>
             <a:r>
-              <a:rPr lang="en-US" smtClean="0"/>
+              <a:rPr lang="en-US"/>
               <a:t>Click to edit Master text styles</a:t>
             </a:r>
           </a:p>
           <a:p>
             <a:pPr lvl="1"/>
             <a:r>
-              <a:rPr lang="en-US" smtClean="0"/>
+              <a:rPr lang="en-US"/>
               <a:t>Second level</a:t>
             </a:r>
           </a:p>
           <a:p>
             <a:pPr lvl="2"/>
             <a:r>
-              <a:rPr lang="en-US" smtClean="0"/>
+              <a:rPr lang="en-US"/>
               <a:t>Third level</a:t>
             </a:r>
           </a:p>
           <a:p>
             <a:pPr lvl="3"/>
             <a:r>
-              <a:rPr lang="en-US" smtClean="0"/>
+              <a:rPr lang="en-US"/>
               <a:t>Fourth level</a:t>
             </a:r>
           </a:p>
           <a:p>
             <a:pPr lvl="4"/>
             <a:r>
-              <a:rPr lang="en-US" smtClean="0"/>
+              <a:rPr lang="en-US"/>
               <a:t>Fifth level</a:t>
             </a:r>
-            <a:endParaRPr lang="en-US"/>
           </a:p>
         </p:txBody>
       </p:sp>
@@ -2117,7 +2117,7 @@
           <a:p>
             <a:fld id="{78C97017-6FC3-485B-9764-EAC9E56C1D49}" type="datetimeFigureOut">
               <a:rPr lang="en-US" smtClean="0"/>
-              <a:t>10/16/2016</a:t>
+              <a:t>3/21/2018</a:t>
             </a:fld>
             <a:endParaRPr lang="en-US"/>
           </a:p>
@@ -2211,10 +2211,9 @@
           <a:lstStyle/>
           <a:p>
             <a:r>
-              <a:rPr lang="en-US" smtClean="0"/>
+              <a:rPr lang="en-US"/>
               <a:t>Click to edit Master title style</a:t>
             </a:r>
-            <a:endParaRPr lang="en-US"/>
           </a:p>
         </p:txBody>
       </p:sp>
@@ -2235,7 +2234,7 @@
           <a:p>
             <a:fld id="{78C97017-6FC3-485B-9764-EAC9E56C1D49}" type="datetimeFigureOut">
               <a:rPr lang="en-US" smtClean="0"/>
-              <a:t>10/16/2016</a:t>
+              <a:t>3/21/2018</a:t>
             </a:fld>
             <a:endParaRPr lang="en-US"/>
           </a:p>
@@ -2330,7 +2329,7 @@
           <a:p>
             <a:fld id="{78C97017-6FC3-485B-9764-EAC9E56C1D49}" type="datetimeFigureOut">
               <a:rPr lang="en-US" smtClean="0"/>
-              <a:t>10/16/2016</a:t>
+              <a:t>3/21/2018</a:t>
             </a:fld>
             <a:endParaRPr lang="en-US"/>
           </a:p>
@@ -2433,10 +2432,9 @@
           </a:lstStyle>
           <a:p>
             <a:r>
-              <a:rPr lang="en-US" smtClean="0"/>
+              <a:rPr lang="en-US"/>
               <a:t>Click to edit Master title style</a:t>
             </a:r>
-            <a:endParaRPr lang="en-US"/>
           </a:p>
         </p:txBody>
       </p:sp>
@@ -2490,38 +2488,37 @@
           <a:p>
             <a:pPr lvl="0"/>
             <a:r>
-              <a:rPr lang="en-US" smtClean="0"/>
+              <a:rPr lang="en-US"/>
               <a:t>Click to edit Master text styles</a:t>
             </a:r>
           </a:p>
           <a:p>
             <a:pPr lvl="1"/>
             <a:r>
-              <a:rPr lang="en-US" smtClean="0"/>
+              <a:rPr lang="en-US"/>
               <a:t>Second level</a:t>
             </a:r>
           </a:p>
           <a:p>
             <a:pPr lvl="2"/>
             <a:r>
-              <a:rPr lang="en-US" smtClean="0"/>
+              <a:rPr lang="en-US"/>
               <a:t>Third level</a:t>
             </a:r>
           </a:p>
           <a:p>
             <a:pPr lvl="3"/>
             <a:r>
-              <a:rPr lang="en-US" smtClean="0"/>
+              <a:rPr lang="en-US"/>
               <a:t>Fourth level</a:t>
             </a:r>
           </a:p>
           <a:p>
             <a:pPr lvl="4"/>
             <a:r>
-              <a:rPr lang="en-US" smtClean="0"/>
+              <a:rPr lang="en-US"/>
               <a:t>Fifth level</a:t>
             </a:r>
-            <a:endParaRPr lang="en-US"/>
           </a:p>
         </p:txBody>
       </p:sp>
@@ -2584,7 +2581,7 @@
           <a:p>
             <a:pPr lvl="0"/>
             <a:r>
-              <a:rPr lang="en-US" smtClean="0"/>
+              <a:rPr lang="en-US"/>
               <a:t>Click to edit Master text styles</a:t>
             </a:r>
           </a:p>
@@ -2607,7 +2604,7 @@
           <a:p>
             <a:fld id="{78C97017-6FC3-485B-9764-EAC9E56C1D49}" type="datetimeFigureOut">
               <a:rPr lang="en-US" smtClean="0"/>
-              <a:t>10/16/2016</a:t>
+              <a:t>3/21/2018</a:t>
             </a:fld>
             <a:endParaRPr lang="en-US"/>
           </a:p>
@@ -2710,10 +2707,9 @@
           </a:lstStyle>
           <a:p>
             <a:r>
-              <a:rPr lang="en-US" smtClean="0"/>
+              <a:rPr lang="en-US"/>
               <a:t>Click to edit Master title style</a:t>
             </a:r>
-            <a:endParaRPr lang="en-US"/>
           </a:p>
         </p:txBody>
       </p:sp>
@@ -2837,7 +2833,7 @@
           <a:p>
             <a:pPr lvl="0"/>
             <a:r>
-              <a:rPr lang="en-US" smtClean="0"/>
+              <a:rPr lang="en-US"/>
               <a:t>Click to edit Master text styles</a:t>
             </a:r>
           </a:p>
@@ -2860,7 +2856,7 @@
           <a:p>
             <a:fld id="{78C97017-6FC3-485B-9764-EAC9E56C1D49}" type="datetimeFigureOut">
               <a:rPr lang="en-US" smtClean="0"/>
-              <a:t>10/16/2016</a:t>
+              <a:t>3/21/2018</a:t>
             </a:fld>
             <a:endParaRPr lang="en-US"/>
           </a:p>
@@ -2969,10 +2965,9 @@
           <a:lstStyle/>
           <a:p>
             <a:r>
-              <a:rPr lang="en-US" smtClean="0"/>
+              <a:rPr lang="en-US"/>
               <a:t>Click to edit Master title style</a:t>
             </a:r>
-            <a:endParaRPr lang="en-US"/>
           </a:p>
         </p:txBody>
       </p:sp>
@@ -3003,38 +2998,37 @@
           <a:p>
             <a:pPr lvl="0"/>
             <a:r>
-              <a:rPr lang="en-US" smtClean="0"/>
+              <a:rPr lang="en-US"/>
               <a:t>Click to edit Master text styles</a:t>
             </a:r>
           </a:p>
           <a:p>
             <a:pPr lvl="1"/>
             <a:r>
-              <a:rPr lang="en-US" smtClean="0"/>
+              <a:rPr lang="en-US"/>
               <a:t>Second level</a:t>
             </a:r>
           </a:p>
           <a:p>
             <a:pPr lvl="2"/>
             <a:r>
-              <a:rPr lang="en-US" smtClean="0"/>
+              <a:rPr lang="en-US"/>
               <a:t>Third level</a:t>
             </a:r>
           </a:p>
           <a:p>
             <a:pPr lvl="3"/>
             <a:r>
-              <a:rPr lang="en-US" smtClean="0"/>
+              <a:rPr lang="en-US"/>
               <a:t>Fourth level</a:t>
             </a:r>
           </a:p>
           <a:p>
             <a:pPr lvl="4"/>
             <a:r>
-              <a:rPr lang="en-US" smtClean="0"/>
+              <a:rPr lang="en-US"/>
               <a:t>Fifth level</a:t>
             </a:r>
-            <a:endParaRPr lang="en-US"/>
           </a:p>
         </p:txBody>
       </p:sp>
@@ -3073,7 +3067,7 @@
           <a:p>
             <a:fld id="{78C97017-6FC3-485B-9764-EAC9E56C1D49}" type="datetimeFigureOut">
               <a:rPr lang="en-US" smtClean="0"/>
-              <a:t>10/16/2016</a:t>
+              <a:t>3/21/2018</a:t>
             </a:fld>
             <a:endParaRPr lang="en-US"/>
           </a:p>
@@ -3456,8 +3450,8 @@
         </p:nvSpPr>
         <p:spPr>
           <a:xfrm>
-            <a:off x="1119865" y="2086382"/>
-            <a:ext cx="7871735" cy="1723618"/>
+            <a:off x="457200" y="2136957"/>
+            <a:ext cx="8458200" cy="2358843"/>
           </a:xfrm>
           <a:prstGeom prst="roundRect">
             <a:avLst>
@@ -3494,7 +3488,7 @@
           <a:lstStyle/>
           <a:p>
             <a:r>
-              <a:rPr lang="en-US" sz="1200" b="1" dirty="0" smtClean="0">
+              <a:rPr lang="en-US" sz="1200" b="1" dirty="0">
                 <a:solidFill>
                   <a:schemeClr val="accent6">
                     <a:lumMod val="75000"/>
@@ -3521,8 +3515,8 @@
         </p:nvSpPr>
         <p:spPr>
           <a:xfrm>
-            <a:off x="2877180" y="3158440"/>
-            <a:ext cx="1323049" cy="346760"/>
+            <a:off x="2214515" y="3209015"/>
+            <a:ext cx="1520861" cy="346760"/>
           </a:xfrm>
           <a:prstGeom prst="rect">
             <a:avLst/>
@@ -3561,7 +3555,7 @@
           <a:p>
             <a:pPr algn="ctr"/>
             <a:r>
-              <a:rPr lang="en-US" sz="1050" dirty="0" smtClean="0">
+              <a:rPr lang="en-US" sz="1050" dirty="0">
                 <a:solidFill>
                   <a:schemeClr val="bg1"/>
                 </a:solidFill>
@@ -3569,14 +3563,14 @@
               <a:t>&lt;&lt;interface&gt;&gt;</a:t>
             </a:r>
             <a:br>
-              <a:rPr lang="en-US" sz="1050" dirty="0" smtClean="0">
+              <a:rPr lang="en-US" sz="1050" dirty="0">
                 <a:solidFill>
                   <a:schemeClr val="bg1"/>
                 </a:solidFill>
               </a:rPr>
             </a:br>
             <a:r>
-              <a:rPr lang="en-US" sz="1050" dirty="0" err="1" smtClean="0">
+              <a:rPr lang="en-US" sz="1050" dirty="0" err="1">
                 <a:solidFill>
                   <a:schemeClr val="bg1"/>
                 </a:solidFill>
@@ -3599,8 +3593,8 @@
         </p:nvSpPr>
         <p:spPr>
           <a:xfrm rot="16200000">
-            <a:off x="1683963" y="2868687"/>
-            <a:ext cx="1093635" cy="346760"/>
+            <a:off x="733451" y="3207110"/>
+            <a:ext cx="1669330" cy="346760"/>
           </a:xfrm>
           <a:prstGeom prst="rect">
             <a:avLst/>
@@ -3639,7 +3633,7 @@
           <a:p>
             <a:pPr algn="ctr"/>
             <a:r>
-              <a:rPr lang="en-US" sz="1050" dirty="0" err="1" smtClean="0">
+              <a:rPr lang="en-US" sz="1050" dirty="0" err="1">
                 <a:solidFill>
                   <a:schemeClr val="bg1"/>
                 </a:solidFill>
@@ -3662,8 +3656,8 @@
         </p:nvSpPr>
         <p:spPr>
           <a:xfrm rot="16200000">
-            <a:off x="956202" y="2861202"/>
-            <a:ext cx="1093635" cy="346760"/>
+            <a:off x="5690" y="3199625"/>
+            <a:ext cx="1669330" cy="346760"/>
           </a:xfrm>
           <a:prstGeom prst="rect">
             <a:avLst/>
@@ -3713,7 +3707,7 @@
           <a:p>
             <a:pPr algn="ctr"/>
             <a:r>
-              <a:rPr lang="en-US" sz="1050" dirty="0" smtClean="0">
+              <a:rPr lang="en-US" sz="1050" dirty="0">
                 <a:solidFill>
                   <a:schemeClr val="bg1"/>
                 </a:solidFill>
@@ -3736,7 +3730,7 @@
         </p:nvSpPr>
         <p:spPr>
           <a:xfrm rot="16200000">
-            <a:off x="1626910" y="2952291"/>
+            <a:off x="964245" y="3298226"/>
             <a:ext cx="270504" cy="175523"/>
           </a:xfrm>
           <a:prstGeom prst="triangle">
@@ -3787,6 +3781,7 @@
         <p:nvCxnSpPr>
           <p:cNvPr id="58" name="Straight Arrow Connector 57"/>
           <p:cNvCxnSpPr>
+            <a:cxnSpLocks/>
             <a:stCxn id="42" idx="3"/>
             <a:endCxn id="2" idx="1"/>
           </p:cNvCxnSpPr>
@@ -3794,7 +3789,7 @@
         </p:nvCxnSpPr>
         <p:spPr>
           <a:xfrm>
-            <a:off x="2656370" y="3326536"/>
+            <a:off x="1993705" y="3377111"/>
             <a:ext cx="220810" cy="5284"/>
           </a:xfrm>
           <a:prstGeom prst="straightConnector1">
@@ -3829,12 +3824,14 @@
       <p:cxnSp>
         <p:nvCxnSpPr>
           <p:cNvPr id="75" name="Elbow Connector 122"/>
-          <p:cNvCxnSpPr/>
+          <p:cNvCxnSpPr>
+            <a:cxnSpLocks/>
+          </p:cNvCxnSpPr>
           <p:nvPr/>
         </p:nvCxnSpPr>
         <p:spPr>
           <a:xfrm>
-            <a:off x="910091" y="3040053"/>
+            <a:off x="247426" y="3385988"/>
             <a:ext cx="419548" cy="2860"/>
           </a:xfrm>
           <a:prstGeom prst="bentConnector3">
@@ -3879,7 +3876,7 @@
         </p:nvCxnSpPr>
         <p:spPr>
           <a:xfrm flipV="1">
-            <a:off x="1849924" y="3040052"/>
+            <a:off x="1187259" y="3385987"/>
             <a:ext cx="216105" cy="1"/>
           </a:xfrm>
           <a:prstGeom prst="line">
@@ -3920,7 +3917,7 @@
         </p:nvSpPr>
         <p:spPr>
           <a:xfrm>
-            <a:off x="2420322" y="3239846"/>
+            <a:off x="1757657" y="3290421"/>
             <a:ext cx="236048" cy="173380"/>
           </a:xfrm>
           <a:prstGeom prst="flowChartDecision">
@@ -3974,7 +3971,7 @@
         </p:nvCxnSpPr>
         <p:spPr>
           <a:xfrm flipV="1">
-            <a:off x="4398041" y="3331820"/>
+            <a:off x="3913830" y="3384803"/>
             <a:ext cx="223324" cy="1"/>
           </a:xfrm>
           <a:prstGeom prst="bentConnector3">
@@ -4017,7 +4014,7 @@
         </p:nvSpPr>
         <p:spPr>
           <a:xfrm rot="5400000" flipV="1">
-            <a:off x="4175027" y="3244059"/>
+            <a:off x="3690816" y="3297042"/>
             <a:ext cx="270504" cy="175523"/>
           </a:xfrm>
           <a:prstGeom prst="triangle">
@@ -4075,7 +4072,7 @@
         </p:nvCxnSpPr>
         <p:spPr>
           <a:xfrm>
-            <a:off x="5791200" y="3331820"/>
+            <a:off x="5306989" y="3384803"/>
             <a:ext cx="228600" cy="1970"/>
           </a:xfrm>
           <a:prstGeom prst="bentConnector3">
@@ -4118,7 +4115,7 @@
         </p:nvSpPr>
         <p:spPr>
           <a:xfrm>
-            <a:off x="4621365" y="3158440"/>
+            <a:off x="4137154" y="3211423"/>
             <a:ext cx="1169835" cy="346760"/>
           </a:xfrm>
           <a:prstGeom prst="rect">
@@ -4147,7 +4144,7 @@
           <a:p>
             <a:pPr algn="ctr"/>
             <a:r>
-              <a:rPr lang="en-US" sz="1050" b="1" dirty="0" err="1" smtClean="0">
+              <a:rPr lang="en-US" sz="1050" b="1" dirty="0" err="1">
                 <a:solidFill>
                   <a:schemeClr val="accent6">
                     <a:lumMod val="75000"/>
@@ -4156,18 +4153,8 @@
               </a:rPr>
               <a:t>XmlAddressBook</a:t>
             </a:r>
-            <a:r>
-              <a:rPr lang="en-US" sz="1050" b="1" dirty="0" smtClean="0">
-                <a:solidFill>
-                  <a:schemeClr val="accent6">
-                    <a:lumMod val="75000"/>
-                  </a:schemeClr>
-                </a:solidFill>
-              </a:rPr>
-              <a:t/>
-            </a:r>
             <a:br>
-              <a:rPr lang="en-US" sz="1050" b="1" dirty="0" smtClean="0">
+              <a:rPr lang="en-US" sz="1050" b="1" dirty="0">
                 <a:solidFill>
                   <a:schemeClr val="accent6">
                     <a:lumMod val="75000"/>
@@ -4176,7 +4163,7 @@
               </a:rPr>
             </a:br>
             <a:r>
-              <a:rPr lang="en-US" sz="1050" b="1" dirty="0" smtClean="0">
+              <a:rPr lang="en-US" sz="1050" b="1" dirty="0">
                 <a:solidFill>
                   <a:schemeClr val="accent6">
                     <a:lumMod val="75000"/>
@@ -4203,8 +4190,8 @@
         </p:nvSpPr>
         <p:spPr>
           <a:xfrm>
-            <a:off x="2873943" y="2558040"/>
-            <a:ext cx="1323049" cy="346760"/>
+            <a:off x="2211278" y="2608615"/>
+            <a:ext cx="1520861" cy="346760"/>
           </a:xfrm>
           <a:prstGeom prst="rect">
             <a:avLst/>
@@ -4243,7 +4230,7 @@
           <a:p>
             <a:pPr algn="ctr"/>
             <a:r>
-              <a:rPr lang="en-US" sz="1050" dirty="0" smtClean="0">
+              <a:rPr lang="en-US" sz="1050" dirty="0">
                 <a:solidFill>
                   <a:schemeClr val="bg1"/>
                 </a:solidFill>
@@ -4251,14 +4238,14 @@
               <a:t>&lt;&lt;interface&gt;&gt;</a:t>
             </a:r>
             <a:br>
-              <a:rPr lang="en-US" sz="1050" dirty="0" smtClean="0">
+              <a:rPr lang="en-US" sz="1050" dirty="0">
                 <a:solidFill>
                   <a:schemeClr val="bg1"/>
                 </a:solidFill>
               </a:rPr>
             </a:br>
             <a:r>
-              <a:rPr lang="en-US" sz="1050" dirty="0" err="1" smtClean="0">
+              <a:rPr lang="en-US" sz="1050" dirty="0" err="1">
                 <a:solidFill>
                   <a:schemeClr val="bg1"/>
                 </a:solidFill>
@@ -4277,6 +4264,7 @@
         <p:nvCxnSpPr>
           <p:cNvPr id="54" name="Straight Arrow Connector 53"/>
           <p:cNvCxnSpPr>
+            <a:cxnSpLocks/>
             <a:stCxn id="56" idx="3"/>
             <a:endCxn id="52" idx="1"/>
           </p:cNvCxnSpPr>
@@ -4284,7 +4272,7 @@
         </p:nvCxnSpPr>
         <p:spPr>
           <a:xfrm>
-            <a:off x="2653133" y="2726136"/>
+            <a:off x="1990468" y="2776711"/>
             <a:ext cx="220810" cy="5284"/>
           </a:xfrm>
           <a:prstGeom prst="straightConnector1">
@@ -4324,7 +4312,7 @@
         </p:nvSpPr>
         <p:spPr>
           <a:xfrm>
-            <a:off x="2417085" y="2639446"/>
+            <a:off x="1754420" y="2690021"/>
             <a:ext cx="236048" cy="173380"/>
           </a:xfrm>
           <a:prstGeom prst="flowChartDecision">
@@ -4371,6 +4359,7 @@
         <p:nvCxnSpPr>
           <p:cNvPr id="60" name="Elbow Connector 63"/>
           <p:cNvCxnSpPr>
+            <a:cxnSpLocks/>
             <a:stCxn id="61" idx="3"/>
             <a:endCxn id="65" idx="1"/>
           </p:cNvCxnSpPr>
@@ -4378,7 +4367,7 @@
         </p:nvCxnSpPr>
         <p:spPr>
           <a:xfrm flipV="1">
-            <a:off x="4394804" y="2731420"/>
+            <a:off x="3910593" y="2784403"/>
             <a:ext cx="223324" cy="1"/>
           </a:xfrm>
           <a:prstGeom prst="bentConnector3">
@@ -4421,7 +4410,7 @@
         </p:nvSpPr>
         <p:spPr>
           <a:xfrm rot="5400000" flipV="1">
-            <a:off x="4171790" y="2643659"/>
+            <a:off x="3687579" y="2696642"/>
             <a:ext cx="270504" cy="175523"/>
           </a:xfrm>
           <a:prstGeom prst="triangle">
@@ -4476,8 +4465,8 @@
         </p:nvSpPr>
         <p:spPr>
           <a:xfrm>
-            <a:off x="4618128" y="2558040"/>
-            <a:ext cx="1093635" cy="346760"/>
+            <a:off x="4133917" y="2611023"/>
+            <a:ext cx="1169835" cy="346760"/>
           </a:xfrm>
           <a:prstGeom prst="rect">
             <a:avLst/>
@@ -4516,30 +4505,22 @@
           <a:p>
             <a:pPr algn="ctr"/>
             <a:r>
-              <a:rPr lang="en-US" sz="1050" dirty="0" err="1" smtClean="0">
+              <a:rPr lang="en-US" sz="1050" dirty="0" err="1">
                 <a:solidFill>
                   <a:schemeClr val="bg1"/>
                 </a:solidFill>
               </a:rPr>
               <a:t>JsonUserPrefs</a:t>
             </a:r>
-            <a:r>
-              <a:rPr lang="en-US" sz="1050" dirty="0" smtClean="0">
-                <a:solidFill>
-                  <a:schemeClr val="bg1"/>
-                </a:solidFill>
-              </a:rPr>
-              <a:t/>
-            </a:r>
             <a:br>
-              <a:rPr lang="en-US" sz="1050" dirty="0" smtClean="0">
+              <a:rPr lang="en-US" sz="1050" dirty="0">
                 <a:solidFill>
                   <a:schemeClr val="bg1"/>
                 </a:solidFill>
               </a:rPr>
             </a:br>
             <a:r>
-              <a:rPr lang="en-US" sz="1050" dirty="0" smtClean="0">
+              <a:rPr lang="en-US" sz="1050" dirty="0">
                 <a:solidFill>
                   <a:schemeClr val="bg1"/>
                 </a:solidFill>
@@ -4562,7 +4543,7 @@
         </p:nvSpPr>
         <p:spPr>
           <a:xfrm>
-            <a:off x="6019800" y="3160410"/>
+            <a:off x="5535589" y="3213393"/>
             <a:ext cx="1200707" cy="346760"/>
           </a:xfrm>
           <a:prstGeom prst="rect">
@@ -4591,7 +4572,7 @@
           <a:p>
             <a:pPr algn="ctr"/>
             <a:r>
-              <a:rPr lang="en-US" sz="1050" b="1" dirty="0" err="1" smtClean="0">
+              <a:rPr lang="en-US" sz="1050" b="1" dirty="0" err="1">
                 <a:solidFill>
                   <a:schemeClr val="accent6">
                     <a:lumMod val="75000"/>
@@ -4600,18 +4581,8 @@
               </a:rPr>
               <a:t>XmlSerializable</a:t>
             </a:r>
-            <a:r>
-              <a:rPr lang="en-US" sz="1050" b="1" dirty="0" smtClean="0">
-                <a:solidFill>
-                  <a:schemeClr val="accent6">
-                    <a:lumMod val="75000"/>
-                  </a:schemeClr>
-                </a:solidFill>
-              </a:rPr>
-              <a:t/>
-            </a:r>
             <a:br>
-              <a:rPr lang="en-US" sz="1050" b="1" dirty="0" smtClean="0">
+              <a:rPr lang="en-US" sz="1050" b="1" dirty="0">
                 <a:solidFill>
                   <a:schemeClr val="accent6">
                     <a:lumMod val="75000"/>
@@ -4620,7 +4591,7 @@
               </a:rPr>
             </a:br>
             <a:r>
-              <a:rPr lang="en-US" sz="1050" b="1" dirty="0" err="1" smtClean="0">
+              <a:rPr lang="en-US" sz="1050" b="1" dirty="0" err="1">
                 <a:solidFill>
                   <a:schemeClr val="accent6">
                     <a:lumMod val="75000"/>
@@ -4643,6 +4614,7 @@
         <p:nvCxnSpPr>
           <p:cNvPr id="70" name="Elbow Connector 122"/>
           <p:cNvCxnSpPr>
+            <a:cxnSpLocks/>
             <a:stCxn id="74" idx="0"/>
             <a:endCxn id="73" idx="2"/>
           </p:cNvCxnSpPr>
@@ -4650,7 +4622,7 @@
         </p:nvCxnSpPr>
         <p:spPr>
           <a:xfrm rot="5400000" flipH="1" flipV="1">
-            <a:off x="8077993" y="2992020"/>
+            <a:off x="7771865" y="3045003"/>
             <a:ext cx="335208" cy="12700"/>
           </a:xfrm>
           <a:prstGeom prst="bentConnector3">
@@ -4688,8 +4660,8 @@
         </p:nvSpPr>
         <p:spPr>
           <a:xfrm>
-            <a:off x="7615738" y="2477656"/>
-            <a:ext cx="1259718" cy="346760"/>
+            <a:off x="7131527" y="2530639"/>
+            <a:ext cx="1615884" cy="346760"/>
           </a:xfrm>
           <a:prstGeom prst="rect">
             <a:avLst/>
@@ -4717,7 +4689,7 @@
           <a:p>
             <a:pPr algn="ctr"/>
             <a:r>
-              <a:rPr lang="en-US" sz="1050" b="1" dirty="0" err="1" smtClean="0">
+              <a:rPr lang="en-US" sz="1050" b="1" dirty="0" err="1">
                 <a:solidFill>
                   <a:schemeClr val="accent6">
                     <a:lumMod val="75000"/>
@@ -4744,8 +4716,8 @@
         </p:nvSpPr>
         <p:spPr>
           <a:xfrm>
-            <a:off x="7615738" y="3159624"/>
-            <a:ext cx="1259718" cy="346760"/>
+            <a:off x="7131527" y="3212607"/>
+            <a:ext cx="1615884" cy="346760"/>
           </a:xfrm>
           <a:prstGeom prst="rect">
             <a:avLst/>
@@ -4773,7 +4745,7 @@
           <a:p>
             <a:pPr algn="ctr"/>
             <a:r>
-              <a:rPr lang="en-US" sz="1050" b="1" dirty="0" err="1" smtClean="0">
+              <a:rPr lang="en-US" sz="1050" b="1" dirty="0" err="1">
                 <a:solidFill>
                   <a:schemeClr val="accent6">
                     <a:lumMod val="75000"/>
@@ -4796,6 +4768,7 @@
         <p:nvCxnSpPr>
           <p:cNvPr id="77" name="Elbow Connector 122"/>
           <p:cNvCxnSpPr>
+            <a:cxnSpLocks/>
             <a:stCxn id="66" idx="3"/>
             <a:endCxn id="74" idx="1"/>
           </p:cNvCxnSpPr>
@@ -4803,7 +4776,616 @@
         </p:nvCxnSpPr>
         <p:spPr>
           <a:xfrm flipV="1">
-            <a:off x="7220507" y="3333004"/>
+            <a:off x="6736296" y="3385987"/>
+            <a:ext cx="395231" cy="786"/>
+          </a:xfrm>
+          <a:prstGeom prst="bentConnector3">
+            <a:avLst>
+              <a:gd name="adj1" fmla="val 50000"/>
+            </a:avLst>
+          </a:prstGeom>
+          <a:ln w="19050">
+            <a:prstDash val="sysDot"/>
+            <a:headEnd type="none" w="med" len="med"/>
+            <a:tailEnd type="arrow" w="med" len="med"/>
+          </a:ln>
+          <a:effectLst/>
+        </p:spPr>
+        <p:style>
+          <a:lnRef idx="1">
+            <a:schemeClr val="accent6"/>
+          </a:lnRef>
+          <a:fillRef idx="2">
+            <a:schemeClr val="accent6"/>
+          </a:fillRef>
+          <a:effectRef idx="1">
+            <a:schemeClr val="accent6"/>
+          </a:effectRef>
+          <a:fontRef idx="minor">
+            <a:schemeClr val="dk1"/>
+          </a:fontRef>
+        </p:style>
+      </p:cxnSp>
+      <p:sp>
+        <p:nvSpPr>
+          <p:cNvPr id="26" name="Rectangle 8">
+            <a:extLst>
+              <a:ext uri="{FF2B5EF4-FFF2-40B4-BE49-F238E27FC236}">
+                <a16:creationId xmlns:a16="http://schemas.microsoft.com/office/drawing/2014/main" id="{0DD5DBE2-EC87-4841-920F-539C87DED007}"/>
+              </a:ext>
+            </a:extLst>
+          </p:cNvPr>
+          <p:cNvSpPr/>
+          <p:nvPr/>
+        </p:nvSpPr>
+        <p:spPr>
+          <a:xfrm>
+            <a:off x="2191584" y="3808125"/>
+            <a:ext cx="1540555" cy="346760"/>
+          </a:xfrm>
+          <a:prstGeom prst="rect">
+            <a:avLst/>
+          </a:prstGeom>
+          <a:solidFill>
+            <a:schemeClr val="accent6">
+              <a:lumMod val="75000"/>
+            </a:schemeClr>
+          </a:solidFill>
+          <a:ln w="19050">
+            <a:solidFill>
+              <a:schemeClr val="accent6">
+                <a:lumMod val="75000"/>
+              </a:schemeClr>
+            </a:solidFill>
+          </a:ln>
+          <a:effectLst/>
+        </p:spPr>
+        <p:style>
+          <a:lnRef idx="1">
+            <a:schemeClr val="accent2"/>
+          </a:lnRef>
+          <a:fillRef idx="2">
+            <a:schemeClr val="accent2"/>
+          </a:fillRef>
+          <a:effectRef idx="1">
+            <a:schemeClr val="accent2"/>
+          </a:effectRef>
+          <a:fontRef idx="minor">
+            <a:schemeClr val="dk1"/>
+          </a:fontRef>
+        </p:style>
+        <p:txBody>
+          <a:bodyPr rtlCol="0" anchor="ctr"/>
+          <a:lstStyle/>
+          <a:p>
+            <a:pPr algn="ctr"/>
+            <a:r>
+              <a:rPr lang="en-US" sz="1050" dirty="0">
+                <a:solidFill>
+                  <a:schemeClr val="bg1"/>
+                </a:solidFill>
+              </a:rPr>
+              <a:t>&lt;&lt;interface&gt;&gt;</a:t>
+            </a:r>
+            <a:br>
+              <a:rPr lang="en-US" sz="1050" dirty="0">
+                <a:solidFill>
+                  <a:schemeClr val="bg1"/>
+                </a:solidFill>
+              </a:rPr>
+            </a:br>
+            <a:r>
+              <a:rPr lang="en-US" sz="1050" dirty="0" err="1">
+                <a:solidFill>
+                  <a:schemeClr val="bg1"/>
+                </a:solidFill>
+              </a:rPr>
+              <a:t>AppointmentListStorage</a:t>
+            </a:r>
+            <a:endParaRPr lang="en-SG" sz="1050" dirty="0">
+              <a:solidFill>
+                <a:schemeClr val="bg1"/>
+              </a:solidFill>
+            </a:endParaRPr>
+          </a:p>
+        </p:txBody>
+      </p:sp>
+      <p:cxnSp>
+        <p:nvCxnSpPr>
+          <p:cNvPr id="27" name="Straight Arrow Connector 26">
+            <a:extLst>
+              <a:ext uri="{FF2B5EF4-FFF2-40B4-BE49-F238E27FC236}">
+                <a16:creationId xmlns:a16="http://schemas.microsoft.com/office/drawing/2014/main" id="{E7CE32F4-85A2-4364-8B0C-0F531B2485BE}"/>
+              </a:ext>
+            </a:extLst>
+          </p:cNvPr>
+          <p:cNvCxnSpPr>
+            <a:cxnSpLocks/>
+            <a:stCxn id="28" idx="3"/>
+            <a:endCxn id="26" idx="1"/>
+          </p:cNvCxnSpPr>
+          <p:nvPr/>
+        </p:nvCxnSpPr>
+        <p:spPr>
+          <a:xfrm>
+            <a:off x="1970774" y="3976221"/>
+            <a:ext cx="220810" cy="5284"/>
+          </a:xfrm>
+          <a:prstGeom prst="straightConnector1">
+            <a:avLst/>
+          </a:prstGeom>
+          <a:ln w="19050">
+            <a:solidFill>
+              <a:schemeClr val="accent6">
+                <a:lumMod val="75000"/>
+              </a:schemeClr>
+            </a:solidFill>
+            <a:headEnd type="none" w="med" len="med"/>
+            <a:tailEnd type="arrow" w="med" len="med"/>
+          </a:ln>
+          <a:effectLst/>
+        </p:spPr>
+        <p:style>
+          <a:lnRef idx="1">
+            <a:schemeClr val="accent2"/>
+          </a:lnRef>
+          <a:fillRef idx="2">
+            <a:schemeClr val="accent2"/>
+          </a:fillRef>
+          <a:effectRef idx="1">
+            <a:schemeClr val="accent2"/>
+          </a:effectRef>
+          <a:fontRef idx="minor">
+            <a:schemeClr val="dk1"/>
+          </a:fontRef>
+        </p:style>
+      </p:cxnSp>
+      <p:sp>
+        <p:nvSpPr>
+          <p:cNvPr id="28" name="Flowchart: Decision 96">
+            <a:extLst>
+              <a:ext uri="{FF2B5EF4-FFF2-40B4-BE49-F238E27FC236}">
+                <a16:creationId xmlns:a16="http://schemas.microsoft.com/office/drawing/2014/main" id="{667CD2A8-251A-40CA-AD33-AE89CE7FF92F}"/>
+              </a:ext>
+            </a:extLst>
+          </p:cNvPr>
+          <p:cNvSpPr/>
+          <p:nvPr/>
+        </p:nvSpPr>
+        <p:spPr>
+          <a:xfrm>
+            <a:off x="1734726" y="3889531"/>
+            <a:ext cx="236048" cy="173380"/>
+          </a:xfrm>
+          <a:prstGeom prst="flowChartDecision">
+            <a:avLst/>
+          </a:prstGeom>
+          <a:noFill/>
+          <a:ln w="19050">
+            <a:solidFill>
+              <a:schemeClr val="accent6">
+                <a:lumMod val="75000"/>
+              </a:schemeClr>
+            </a:solidFill>
+          </a:ln>
+          <a:effectLst/>
+        </p:spPr>
+        <p:style>
+          <a:lnRef idx="1">
+            <a:schemeClr val="accent2"/>
+          </a:lnRef>
+          <a:fillRef idx="2">
+            <a:schemeClr val="accent2"/>
+          </a:fillRef>
+          <a:effectRef idx="1">
+            <a:schemeClr val="accent2"/>
+          </a:effectRef>
+          <a:fontRef idx="minor">
+            <a:schemeClr val="dk1"/>
+          </a:fontRef>
+        </p:style>
+        <p:txBody>
+          <a:bodyPr rtlCol="0" anchor="ctr"/>
+          <a:lstStyle/>
+          <a:p>
+            <a:pPr algn="ctr"/>
+            <a:endParaRPr lang="en-US" sz="1050">
+              <a:solidFill>
+                <a:schemeClr val="bg1"/>
+              </a:solidFill>
+            </a:endParaRPr>
+          </a:p>
+        </p:txBody>
+      </p:sp>
+      <p:cxnSp>
+        <p:nvCxnSpPr>
+          <p:cNvPr id="34" name="Elbow Connector 63">
+            <a:extLst>
+              <a:ext uri="{FF2B5EF4-FFF2-40B4-BE49-F238E27FC236}">
+                <a16:creationId xmlns:a16="http://schemas.microsoft.com/office/drawing/2014/main" id="{6D73C3EC-ACD9-4274-B0BE-B44C61B9564C}"/>
+              </a:ext>
+            </a:extLst>
+          </p:cNvPr>
+          <p:cNvCxnSpPr>
+            <a:stCxn id="35" idx="3"/>
+            <a:endCxn id="37" idx="1"/>
+          </p:cNvCxnSpPr>
+          <p:nvPr/>
+        </p:nvCxnSpPr>
+        <p:spPr>
+          <a:xfrm flipV="1">
+            <a:off x="3910593" y="3994535"/>
+            <a:ext cx="223324" cy="1"/>
+          </a:xfrm>
+          <a:prstGeom prst="bentConnector3">
+            <a:avLst>
+              <a:gd name="adj1" fmla="val 50000"/>
+            </a:avLst>
+          </a:prstGeom>
+          <a:ln w="19050">
+            <a:solidFill>
+              <a:schemeClr val="accent6">
+                <a:lumMod val="75000"/>
+              </a:schemeClr>
+            </a:solidFill>
+            <a:prstDash val="sysDot"/>
+            <a:headEnd type="none" w="med" len="med"/>
+            <a:tailEnd type="none" w="med" len="med"/>
+          </a:ln>
+          <a:effectLst/>
+        </p:spPr>
+        <p:style>
+          <a:lnRef idx="1">
+            <a:schemeClr val="accent2"/>
+          </a:lnRef>
+          <a:fillRef idx="2">
+            <a:schemeClr val="accent2"/>
+          </a:fillRef>
+          <a:effectRef idx="1">
+            <a:schemeClr val="accent2"/>
+          </a:effectRef>
+          <a:fontRef idx="minor">
+            <a:schemeClr val="dk1"/>
+          </a:fontRef>
+        </p:style>
+      </p:cxnSp>
+      <p:sp>
+        <p:nvSpPr>
+          <p:cNvPr id="35" name="Isosceles Triangle 102">
+            <a:extLst>
+              <a:ext uri="{FF2B5EF4-FFF2-40B4-BE49-F238E27FC236}">
+                <a16:creationId xmlns:a16="http://schemas.microsoft.com/office/drawing/2014/main" id="{94FDDD88-64A3-4B98-854C-730DCAC61864}"/>
+              </a:ext>
+            </a:extLst>
+          </p:cNvPr>
+          <p:cNvSpPr/>
+          <p:nvPr/>
+        </p:nvSpPr>
+        <p:spPr>
+          <a:xfrm rot="5400000" flipV="1">
+            <a:off x="3687579" y="3906774"/>
+            <a:ext cx="270504" cy="175523"/>
+          </a:xfrm>
+          <a:prstGeom prst="triangle">
+            <a:avLst/>
+          </a:prstGeom>
+          <a:solidFill>
+            <a:schemeClr val="accent6">
+              <a:lumMod val="75000"/>
+            </a:schemeClr>
+          </a:solidFill>
+          <a:ln w="19050">
+            <a:solidFill>
+              <a:schemeClr val="accent6">
+                <a:lumMod val="75000"/>
+              </a:schemeClr>
+            </a:solidFill>
+          </a:ln>
+          <a:effectLst/>
+        </p:spPr>
+        <p:style>
+          <a:lnRef idx="1">
+            <a:schemeClr val="accent2"/>
+          </a:lnRef>
+          <a:fillRef idx="2">
+            <a:schemeClr val="accent2"/>
+          </a:fillRef>
+          <a:effectRef idx="1">
+            <a:schemeClr val="accent2"/>
+          </a:effectRef>
+          <a:fontRef idx="minor">
+            <a:schemeClr val="dk1"/>
+          </a:fontRef>
+        </p:style>
+        <p:txBody>
+          <a:bodyPr rtlCol="0" anchor="ctr"/>
+          <a:lstStyle/>
+          <a:p>
+            <a:pPr algn="ctr"/>
+            <a:endParaRPr lang="en-SG" sz="1050">
+              <a:solidFill>
+                <a:schemeClr val="bg1"/>
+              </a:solidFill>
+            </a:endParaRPr>
+          </a:p>
+        </p:txBody>
+      </p:sp>
+      <p:cxnSp>
+        <p:nvCxnSpPr>
+          <p:cNvPr id="36" name="Elbow Connector 122">
+            <a:extLst>
+              <a:ext uri="{FF2B5EF4-FFF2-40B4-BE49-F238E27FC236}">
+                <a16:creationId xmlns:a16="http://schemas.microsoft.com/office/drawing/2014/main" id="{71B42553-0766-4935-B2A5-2A83C9E88148}"/>
+              </a:ext>
+            </a:extLst>
+          </p:cNvPr>
+          <p:cNvCxnSpPr>
+            <a:stCxn id="37" idx="3"/>
+            <a:endCxn id="38" idx="1"/>
+          </p:cNvCxnSpPr>
+          <p:nvPr/>
+        </p:nvCxnSpPr>
+        <p:spPr>
+          <a:xfrm>
+            <a:off x="5303752" y="3994535"/>
+            <a:ext cx="228600" cy="1970"/>
+          </a:xfrm>
+          <a:prstGeom prst="bentConnector3">
+            <a:avLst>
+              <a:gd name="adj1" fmla="val 50000"/>
+            </a:avLst>
+          </a:prstGeom>
+          <a:ln w="19050">
+            <a:solidFill>
+              <a:schemeClr val="accent6">
+                <a:lumMod val="75000"/>
+              </a:schemeClr>
+            </a:solidFill>
+            <a:prstDash val="sysDot"/>
+            <a:headEnd type="none" w="med" len="med"/>
+            <a:tailEnd type="arrow" w="med" len="med"/>
+          </a:ln>
+          <a:effectLst/>
+        </p:spPr>
+        <p:style>
+          <a:lnRef idx="1">
+            <a:schemeClr val="accent2"/>
+          </a:lnRef>
+          <a:fillRef idx="2">
+            <a:schemeClr val="accent2"/>
+          </a:fillRef>
+          <a:effectRef idx="1">
+            <a:schemeClr val="accent2"/>
+          </a:effectRef>
+          <a:fontRef idx="minor">
+            <a:schemeClr val="dk1"/>
+          </a:fontRef>
+        </p:style>
+      </p:cxnSp>
+      <p:sp>
+        <p:nvSpPr>
+          <p:cNvPr id="37" name="Rectangle 8">
+            <a:extLst>
+              <a:ext uri="{FF2B5EF4-FFF2-40B4-BE49-F238E27FC236}">
+                <a16:creationId xmlns:a16="http://schemas.microsoft.com/office/drawing/2014/main" id="{188CF59E-4EF5-4F42-984A-5EBB2B85C325}"/>
+              </a:ext>
+            </a:extLst>
+          </p:cNvPr>
+          <p:cNvSpPr/>
+          <p:nvPr/>
+        </p:nvSpPr>
+        <p:spPr>
+          <a:xfrm>
+            <a:off x="4133917" y="3821155"/>
+            <a:ext cx="1169835" cy="346760"/>
+          </a:xfrm>
+          <a:prstGeom prst="rect">
+            <a:avLst/>
+          </a:prstGeom>
+          <a:ln w="19050"/>
+          <a:effectLst/>
+        </p:spPr>
+        <p:style>
+          <a:lnRef idx="1">
+            <a:schemeClr val="accent6"/>
+          </a:lnRef>
+          <a:fillRef idx="2">
+            <a:schemeClr val="accent6"/>
+          </a:fillRef>
+          <a:effectRef idx="1">
+            <a:schemeClr val="accent6"/>
+          </a:effectRef>
+          <a:fontRef idx="minor">
+            <a:schemeClr val="dk1"/>
+          </a:fontRef>
+        </p:style>
+        <p:txBody>
+          <a:bodyPr rtlCol="0" anchor="ctr"/>
+          <a:lstStyle/>
+          <a:p>
+            <a:pPr algn="ctr"/>
+            <a:r>
+              <a:rPr lang="en-US" sz="1050" b="1" dirty="0" err="1">
+                <a:solidFill>
+                  <a:schemeClr val="accent6">
+                    <a:lumMod val="75000"/>
+                  </a:schemeClr>
+                </a:solidFill>
+              </a:rPr>
+              <a:t>XmlAppointmentListStorage</a:t>
+            </a:r>
+            <a:endParaRPr lang="en-SG" sz="1050" b="1" dirty="0">
+              <a:solidFill>
+                <a:schemeClr val="accent6">
+                  <a:lumMod val="75000"/>
+                </a:schemeClr>
+              </a:solidFill>
+            </a:endParaRPr>
+          </a:p>
+        </p:txBody>
+      </p:sp>
+      <p:sp>
+        <p:nvSpPr>
+          <p:cNvPr id="38" name="Rectangle 8">
+            <a:extLst>
+              <a:ext uri="{FF2B5EF4-FFF2-40B4-BE49-F238E27FC236}">
+                <a16:creationId xmlns:a16="http://schemas.microsoft.com/office/drawing/2014/main" id="{71ECF2FF-6A39-4B94-AC94-B10280C409A5}"/>
+              </a:ext>
+            </a:extLst>
+          </p:cNvPr>
+          <p:cNvSpPr/>
+          <p:nvPr/>
+        </p:nvSpPr>
+        <p:spPr>
+          <a:xfrm>
+            <a:off x="5532352" y="3823125"/>
+            <a:ext cx="1200707" cy="346760"/>
+          </a:xfrm>
+          <a:prstGeom prst="rect">
+            <a:avLst/>
+          </a:prstGeom>
+          <a:ln w="19050"/>
+          <a:effectLst/>
+        </p:spPr>
+        <p:style>
+          <a:lnRef idx="1">
+            <a:schemeClr val="accent6"/>
+          </a:lnRef>
+          <a:fillRef idx="2">
+            <a:schemeClr val="accent6"/>
+          </a:fillRef>
+          <a:effectRef idx="1">
+            <a:schemeClr val="accent6"/>
+          </a:effectRef>
+          <a:fontRef idx="minor">
+            <a:schemeClr val="dk1"/>
+          </a:fontRef>
+        </p:style>
+        <p:txBody>
+          <a:bodyPr rtlCol="0" anchor="ctr"/>
+          <a:lstStyle/>
+          <a:p>
+            <a:pPr algn="ctr"/>
+            <a:r>
+              <a:rPr lang="en-US" sz="1050" b="1" dirty="0" err="1">
+                <a:solidFill>
+                  <a:schemeClr val="accent6">
+                    <a:lumMod val="75000"/>
+                  </a:schemeClr>
+                </a:solidFill>
+              </a:rPr>
+              <a:t>XmlSerializable</a:t>
+            </a:r>
+            <a:br>
+              <a:rPr lang="en-US" sz="1050" b="1" dirty="0">
+                <a:solidFill>
+                  <a:schemeClr val="accent6">
+                    <a:lumMod val="75000"/>
+                  </a:schemeClr>
+                </a:solidFill>
+              </a:rPr>
+            </a:br>
+            <a:r>
+              <a:rPr lang="en-US" sz="1050" b="1" dirty="0" err="1">
+                <a:solidFill>
+                  <a:schemeClr val="accent6">
+                    <a:lumMod val="75000"/>
+                  </a:schemeClr>
+                </a:solidFill>
+              </a:rPr>
+              <a:t>AppointmentList</a:t>
+            </a:r>
+            <a:endParaRPr lang="en-SG" sz="1050" b="1" dirty="0">
+              <a:solidFill>
+                <a:schemeClr val="accent6">
+                  <a:lumMod val="75000"/>
+                </a:schemeClr>
+              </a:solidFill>
+            </a:endParaRPr>
+          </a:p>
+        </p:txBody>
+      </p:sp>
+      <p:sp>
+        <p:nvSpPr>
+          <p:cNvPr id="39" name="Rectangle 8">
+            <a:extLst>
+              <a:ext uri="{FF2B5EF4-FFF2-40B4-BE49-F238E27FC236}">
+                <a16:creationId xmlns:a16="http://schemas.microsoft.com/office/drawing/2014/main" id="{44808906-11DC-415E-8F71-F70D7467D55D}"/>
+              </a:ext>
+            </a:extLst>
+          </p:cNvPr>
+          <p:cNvSpPr/>
+          <p:nvPr/>
+        </p:nvSpPr>
+        <p:spPr>
+          <a:xfrm>
+            <a:off x="7128290" y="3822339"/>
+            <a:ext cx="1615884" cy="346760"/>
+          </a:xfrm>
+          <a:prstGeom prst="rect">
+            <a:avLst/>
+          </a:prstGeom>
+          <a:ln w="19050"/>
+          <a:effectLst/>
+        </p:spPr>
+        <p:style>
+          <a:lnRef idx="1">
+            <a:schemeClr val="accent6"/>
+          </a:lnRef>
+          <a:fillRef idx="2">
+            <a:schemeClr val="accent6"/>
+          </a:fillRef>
+          <a:effectRef idx="1">
+            <a:schemeClr val="accent6"/>
+          </a:effectRef>
+          <a:fontRef idx="minor">
+            <a:schemeClr val="dk1"/>
+          </a:fontRef>
+        </p:style>
+        <p:txBody>
+          <a:bodyPr rtlCol="0" anchor="ctr"/>
+          <a:lstStyle/>
+          <a:p>
+            <a:pPr algn="ctr"/>
+            <a:r>
+              <a:rPr lang="en-US" sz="1050" b="1" dirty="0" err="1">
+                <a:solidFill>
+                  <a:schemeClr val="accent6">
+                    <a:lumMod val="75000"/>
+                  </a:schemeClr>
+                </a:solidFill>
+              </a:rPr>
+              <a:t>XmlAdaptedAppointment</a:t>
+            </a:r>
+            <a:endParaRPr lang="en-SG" sz="1050" b="1" dirty="0">
+              <a:solidFill>
+                <a:schemeClr val="accent6">
+                  <a:lumMod val="75000"/>
+                </a:schemeClr>
+              </a:solidFill>
+            </a:endParaRPr>
+          </a:p>
+        </p:txBody>
+      </p:sp>
+      <p:cxnSp>
+        <p:nvCxnSpPr>
+          <p:cNvPr id="40" name="Elbow Connector 122">
+            <a:extLst>
+              <a:ext uri="{FF2B5EF4-FFF2-40B4-BE49-F238E27FC236}">
+                <a16:creationId xmlns:a16="http://schemas.microsoft.com/office/drawing/2014/main" id="{B5D234C9-6CBE-4E17-BE0F-65EAE40AF024}"/>
+              </a:ext>
+            </a:extLst>
+          </p:cNvPr>
+          <p:cNvCxnSpPr>
+            <a:cxnSpLocks/>
+            <a:stCxn id="38" idx="3"/>
+            <a:endCxn id="39" idx="1"/>
+          </p:cNvCxnSpPr>
+          <p:nvPr/>
+        </p:nvCxnSpPr>
+        <p:spPr>
+          <a:xfrm flipV="1">
+            <a:off x="6733059" y="3995719"/>
             <a:ext cx="395231" cy="786"/>
           </a:xfrm>
           <a:prstGeom prst="bentConnector3">
@@ -4843,13 +5425,6 @@
   <p:clrMapOvr>
     <a:masterClrMapping/>
   </p:clrMapOvr>
-  <p:timing>
-    <p:tnLst>
-      <p:par>
-        <p:cTn id="1" dur="indefinite" restart="never" nodeType="tmRoot"/>
-      </p:par>
-    </p:tnLst>
-  </p:timing>
 </p:sld>
 </file>
 

</xml_diff>